<commit_message>
feat: added pump, hcsr04 to powerpoint
</commit_message>
<xml_diff>
--- a/docs/Smart Garden.pptx
+++ b/docs/Smart Garden.pptx
@@ -9,7 +9,7 @@
     <p:sldId id="257" r:id="rId3"/>
     <p:sldId id="261" r:id="rId4"/>
     <p:sldId id="260" r:id="rId5"/>
-    <p:sldId id="258" r:id="rId6"/>
+    <p:sldId id="265" r:id="rId6"/>
     <p:sldId id="263" r:id="rId7"/>
     <p:sldId id="264" r:id="rId8"/>
     <p:sldId id="259" r:id="rId9"/>
@@ -122,236 +122,10 @@
 <file path=ppt/revisionInfo.xml><?xml version="1.0" encoding="utf-8"?>
 <p1510:revInfo xmlns:a="http://schemas.openxmlformats.org/drawingml/2006/main" xmlns:r="http://schemas.openxmlformats.org/officeDocument/2006/relationships" xmlns:p1510="http://schemas.microsoft.com/office/powerpoint/2015/10/main">
   <p1510:revLst>
+    <p1510:client id="{57C32130-FE90-4796-A918-C20BD1736453}" v="8" dt="2026-01-28T11:25:10.516"/>
     <p1510:client id="{FA22C7F2-C4DB-476C-A55E-363AA47E3EDA}" v="111" dt="2026-01-28T10:46:35.945"/>
   </p1510:revLst>
 </p1510:revInfo>
-</file>
-
-<file path=ppt/changesInfos/changesInfo1.xml><?xml version="1.0" encoding="utf-8"?>
-<pc:chgInfo xmlns:a="http://schemas.openxmlformats.org/drawingml/2006/main" xmlns:r="http://schemas.openxmlformats.org/officeDocument/2006/relationships" xmlns:ac="http://schemas.microsoft.com/office/drawing/2013/main/command" xmlns:pc="http://schemas.microsoft.com/office/powerpoint/2013/main/command">
-  <pc:docChgLst>
-    <pc:chgData name="NICOLO'MASSIMO LISENA" userId="f3d6d6cc-e1af-4921-83db-785f07c959d4" providerId="ADAL" clId="{52300CBB-EB40-437D-AC13-5F91FFBE4C5E}"/>
-    <pc:docChg chg="undo custSel addSld modSld">
-      <pc:chgData name="NICOLO'MASSIMO LISENA" userId="f3d6d6cc-e1af-4921-83db-785f07c959d4" providerId="ADAL" clId="{52300CBB-EB40-437D-AC13-5F91FFBE4C5E}" dt="2026-01-28T10:46:35.945" v="1383" actId="208"/>
-      <pc:docMkLst>
-        <pc:docMk/>
-      </pc:docMkLst>
-      <pc:sldChg chg="addSp modSp mod">
-        <pc:chgData name="NICOLO'MASSIMO LISENA" userId="f3d6d6cc-e1af-4921-83db-785f07c959d4" providerId="ADAL" clId="{52300CBB-EB40-437D-AC13-5F91FFBE4C5E}" dt="2026-01-28T10:15:40.046" v="1115" actId="1076"/>
-        <pc:sldMkLst>
-          <pc:docMk/>
-          <pc:sldMk cId="3738208350" sldId="259"/>
-        </pc:sldMkLst>
-        <pc:spChg chg="mod">
-          <ac:chgData name="NICOLO'MASSIMO LISENA" userId="f3d6d6cc-e1af-4921-83db-785f07c959d4" providerId="ADAL" clId="{52300CBB-EB40-437D-AC13-5F91FFBE4C5E}" dt="2026-01-28T10:15:25.577" v="1114" actId="20577"/>
-          <ac:spMkLst>
-            <pc:docMk/>
-            <pc:sldMk cId="3738208350" sldId="259"/>
-            <ac:spMk id="5" creationId="{00000000-0000-0000-0000-000000000000}"/>
-          </ac:spMkLst>
-        </pc:spChg>
-        <pc:picChg chg="add mod modCrop">
-          <ac:chgData name="NICOLO'MASSIMO LISENA" userId="f3d6d6cc-e1af-4921-83db-785f07c959d4" providerId="ADAL" clId="{52300CBB-EB40-437D-AC13-5F91FFBE4C5E}" dt="2026-01-28T10:15:40.046" v="1115" actId="1076"/>
-          <ac:picMkLst>
-            <pc:docMk/>
-            <pc:sldMk cId="3738208350" sldId="259"/>
-            <ac:picMk id="3" creationId="{921A01DB-A3BC-3CD1-4DA3-A77BBF19909B}"/>
-          </ac:picMkLst>
-        </pc:picChg>
-      </pc:sldChg>
-      <pc:sldChg chg="addSp delSp modSp mod">
-        <pc:chgData name="NICOLO'MASSIMO LISENA" userId="f3d6d6cc-e1af-4921-83db-785f07c959d4" providerId="ADAL" clId="{52300CBB-EB40-437D-AC13-5F91FFBE4C5E}" dt="2026-01-28T10:42:09.973" v="1378" actId="207"/>
-        <pc:sldMkLst>
-          <pc:docMk/>
-          <pc:sldMk cId="1946764872" sldId="263"/>
-        </pc:sldMkLst>
-        <pc:spChg chg="add del mod">
-          <ac:chgData name="NICOLO'MASSIMO LISENA" userId="f3d6d6cc-e1af-4921-83db-785f07c959d4" providerId="ADAL" clId="{52300CBB-EB40-437D-AC13-5F91FFBE4C5E}" dt="2026-01-28T10:17:14.888" v="1128" actId="26606"/>
-          <ac:spMkLst>
-            <pc:docMk/>
-            <pc:sldMk cId="1946764872" sldId="263"/>
-            <ac:spMk id="3" creationId="{6EA2B06F-6D9D-1792-D68B-A6FACC8B98FA}"/>
-          </ac:spMkLst>
-        </pc:spChg>
-        <pc:spChg chg="mod">
-          <ac:chgData name="NICOLO'MASSIMO LISENA" userId="f3d6d6cc-e1af-4921-83db-785f07c959d4" providerId="ADAL" clId="{52300CBB-EB40-437D-AC13-5F91FFBE4C5E}" dt="2026-01-28T09:36:00.394" v="12" actId="20577"/>
-          <ac:spMkLst>
-            <pc:docMk/>
-            <pc:sldMk cId="1946764872" sldId="263"/>
-            <ac:spMk id="4" creationId="{00000000-0000-0000-0000-000000000000}"/>
-          </ac:spMkLst>
-        </pc:spChg>
-        <pc:spChg chg="add mod">
-          <ac:chgData name="NICOLO'MASSIMO LISENA" userId="f3d6d6cc-e1af-4921-83db-785f07c959d4" providerId="ADAL" clId="{52300CBB-EB40-437D-AC13-5F91FFBE4C5E}" dt="2026-01-28T10:19:43.820" v="1138" actId="1076"/>
-          <ac:spMkLst>
-            <pc:docMk/>
-            <pc:sldMk cId="1946764872" sldId="263"/>
-            <ac:spMk id="5" creationId="{47946589-557B-E82A-87DE-7D948966BE45}"/>
-          </ac:spMkLst>
-        </pc:spChg>
-        <pc:graphicFrameChg chg="add del">
-          <ac:chgData name="NICOLO'MASSIMO LISENA" userId="f3d6d6cc-e1af-4921-83db-785f07c959d4" providerId="ADAL" clId="{52300CBB-EB40-437D-AC13-5F91FFBE4C5E}" dt="2026-01-28T10:16:50.116" v="1117" actId="26606"/>
-          <ac:graphicFrameMkLst>
-            <pc:docMk/>
-            <pc:sldMk cId="1946764872" sldId="263"/>
-            <ac:graphicFrameMk id="7" creationId="{F54D3D2E-43D5-C2CC-1E20-67427B24CF3B}"/>
-          </ac:graphicFrameMkLst>
-        </pc:graphicFrameChg>
-        <pc:graphicFrameChg chg="add del">
-          <ac:chgData name="NICOLO'MASSIMO LISENA" userId="f3d6d6cc-e1af-4921-83db-785f07c959d4" providerId="ADAL" clId="{52300CBB-EB40-437D-AC13-5F91FFBE4C5E}" dt="2026-01-28T10:16:57.187" v="1119" actId="26606"/>
-          <ac:graphicFrameMkLst>
-            <pc:docMk/>
-            <pc:sldMk cId="1946764872" sldId="263"/>
-            <ac:graphicFrameMk id="9" creationId="{66810FE2-464C-6718-7487-35B6BDABA90E}"/>
-          </ac:graphicFrameMkLst>
-        </pc:graphicFrameChg>
-        <pc:graphicFrameChg chg="add del">
-          <ac:chgData name="NICOLO'MASSIMO LISENA" userId="f3d6d6cc-e1af-4921-83db-785f07c959d4" providerId="ADAL" clId="{52300CBB-EB40-437D-AC13-5F91FFBE4C5E}" dt="2026-01-28T10:17:06.681" v="1121" actId="26606"/>
-          <ac:graphicFrameMkLst>
-            <pc:docMk/>
-            <pc:sldMk cId="1946764872" sldId="263"/>
-            <ac:graphicFrameMk id="11" creationId="{0DC1C469-0441-8052-4E31-65F97A28C696}"/>
-          </ac:graphicFrameMkLst>
-        </pc:graphicFrameChg>
-        <pc:graphicFrameChg chg="add del">
-          <ac:chgData name="NICOLO'MASSIMO LISENA" userId="f3d6d6cc-e1af-4921-83db-785f07c959d4" providerId="ADAL" clId="{52300CBB-EB40-437D-AC13-5F91FFBE4C5E}" dt="2026-01-28T10:17:09.967" v="1123" actId="26606"/>
-          <ac:graphicFrameMkLst>
-            <pc:docMk/>
-            <pc:sldMk cId="1946764872" sldId="263"/>
-            <ac:graphicFrameMk id="13" creationId="{8545CBAD-9CAE-E4F0-3B49-F0580CEE8F4C}"/>
-          </ac:graphicFrameMkLst>
-        </pc:graphicFrameChg>
-        <pc:graphicFrameChg chg="add del">
-          <ac:chgData name="NICOLO'MASSIMO LISENA" userId="f3d6d6cc-e1af-4921-83db-785f07c959d4" providerId="ADAL" clId="{52300CBB-EB40-437D-AC13-5F91FFBE4C5E}" dt="2026-01-28T10:17:12.222" v="1125" actId="26606"/>
-          <ac:graphicFrameMkLst>
-            <pc:docMk/>
-            <pc:sldMk cId="1946764872" sldId="263"/>
-            <ac:graphicFrameMk id="15" creationId="{66810FE2-464C-6718-7487-35B6BDABA90E}"/>
-          </ac:graphicFrameMkLst>
-        </pc:graphicFrameChg>
-        <pc:graphicFrameChg chg="add del">
-          <ac:chgData name="NICOLO'MASSIMO LISENA" userId="f3d6d6cc-e1af-4921-83db-785f07c959d4" providerId="ADAL" clId="{52300CBB-EB40-437D-AC13-5F91FFBE4C5E}" dt="2026-01-28T10:17:14.851" v="1127" actId="26606"/>
-          <ac:graphicFrameMkLst>
-            <pc:docMk/>
-            <pc:sldMk cId="1946764872" sldId="263"/>
-            <ac:graphicFrameMk id="17" creationId="{F54D3D2E-43D5-C2CC-1E20-67427B24CF3B}"/>
-          </ac:graphicFrameMkLst>
-        </pc:graphicFrameChg>
-        <pc:graphicFrameChg chg="add mod modGraphic">
-          <ac:chgData name="NICOLO'MASSIMO LISENA" userId="f3d6d6cc-e1af-4921-83db-785f07c959d4" providerId="ADAL" clId="{52300CBB-EB40-437D-AC13-5F91FFBE4C5E}" dt="2026-01-28T10:42:09.973" v="1378" actId="207"/>
-          <ac:graphicFrameMkLst>
-            <pc:docMk/>
-            <pc:sldMk cId="1946764872" sldId="263"/>
-            <ac:graphicFrameMk id="19" creationId="{8545CBAD-9CAE-E4F0-3B49-F0580CEE8F4C}"/>
-          </ac:graphicFrameMkLst>
-        </pc:graphicFrameChg>
-        <pc:picChg chg="mod">
-          <ac:chgData name="NICOLO'MASSIMO LISENA" userId="f3d6d6cc-e1af-4921-83db-785f07c959d4" providerId="ADAL" clId="{52300CBB-EB40-437D-AC13-5F91FFBE4C5E}" dt="2026-01-28T10:19:43.820" v="1138" actId="1076"/>
-          <ac:picMkLst>
-            <pc:docMk/>
-            <pc:sldMk cId="1946764872" sldId="263"/>
-            <ac:picMk id="2" creationId="{00000000-0000-0000-0000-000000000000}"/>
-          </ac:picMkLst>
-        </pc:picChg>
-      </pc:sldChg>
-      <pc:sldChg chg="addSp delSp modSp new mod">
-        <pc:chgData name="NICOLO'MASSIMO LISENA" userId="f3d6d6cc-e1af-4921-83db-785f07c959d4" providerId="ADAL" clId="{52300CBB-EB40-437D-AC13-5F91FFBE4C5E}" dt="2026-01-28T10:46:35.945" v="1383" actId="208"/>
-        <pc:sldMkLst>
-          <pc:docMk/>
-          <pc:sldMk cId="4144213770" sldId="264"/>
-        </pc:sldMkLst>
-        <pc:spChg chg="mod">
-          <ac:chgData name="NICOLO'MASSIMO LISENA" userId="f3d6d6cc-e1af-4921-83db-785f07c959d4" providerId="ADAL" clId="{52300CBB-EB40-437D-AC13-5F91FFBE4C5E}" dt="2026-01-28T09:48:35.054" v="240"/>
-          <ac:spMkLst>
-            <pc:docMk/>
-            <pc:sldMk cId="4144213770" sldId="264"/>
-            <ac:spMk id="2" creationId="{D698D47D-F96A-6A1F-9DE3-CDA0EC782727}"/>
-          </ac:spMkLst>
-        </pc:spChg>
-        <pc:spChg chg="add del mod">
-          <ac:chgData name="NICOLO'MASSIMO LISENA" userId="f3d6d6cc-e1af-4921-83db-785f07c959d4" providerId="ADAL" clId="{52300CBB-EB40-437D-AC13-5F91FFBE4C5E}" dt="2026-01-28T10:20:39.344" v="1150" actId="26606"/>
-          <ac:spMkLst>
-            <pc:docMk/>
-            <pc:sldMk cId="4144213770" sldId="264"/>
-            <ac:spMk id="3" creationId="{AE665F70-8338-E59B-AC9C-3642E026BE8C}"/>
-          </ac:spMkLst>
-        </pc:spChg>
-        <pc:spChg chg="add mod">
-          <ac:chgData name="NICOLO'MASSIMO LISENA" userId="f3d6d6cc-e1af-4921-83db-785f07c959d4" providerId="ADAL" clId="{52300CBB-EB40-437D-AC13-5F91FFBE4C5E}" dt="2026-01-28T10:26:01.082" v="1235" actId="113"/>
-          <ac:spMkLst>
-            <pc:docMk/>
-            <pc:sldMk cId="4144213770" sldId="264"/>
-            <ac:spMk id="4" creationId="{AD567897-D20E-CB8E-CE22-22110C3467BE}"/>
-          </ac:spMkLst>
-        </pc:spChg>
-        <pc:spChg chg="add mod">
-          <ac:chgData name="NICOLO'MASSIMO LISENA" userId="f3d6d6cc-e1af-4921-83db-785f07c959d4" providerId="ADAL" clId="{52300CBB-EB40-437D-AC13-5F91FFBE4C5E}" dt="2026-01-28T10:12:23.311" v="1058" actId="1076"/>
-          <ac:spMkLst>
-            <pc:docMk/>
-            <pc:sldMk cId="4144213770" sldId="264"/>
-            <ac:spMk id="6" creationId="{2DE6080A-C80B-048D-6A4C-EEF45D72EB88}"/>
-          </ac:spMkLst>
-        </pc:spChg>
-        <pc:spChg chg="add mod">
-          <ac:chgData name="NICOLO'MASSIMO LISENA" userId="f3d6d6cc-e1af-4921-83db-785f07c959d4" providerId="ADAL" clId="{52300CBB-EB40-437D-AC13-5F91FFBE4C5E}" dt="2026-01-28T10:13:14.469" v="1087" actId="1076"/>
-          <ac:spMkLst>
-            <pc:docMk/>
-            <pc:sldMk cId="4144213770" sldId="264"/>
-            <ac:spMk id="9" creationId="{7B719936-DBD7-DCDE-5B56-CCDAF0F38294}"/>
-          </ac:spMkLst>
-        </pc:spChg>
-        <pc:graphicFrameChg chg="add del">
-          <ac:chgData name="NICOLO'MASSIMO LISENA" userId="f3d6d6cc-e1af-4921-83db-785f07c959d4" providerId="ADAL" clId="{52300CBB-EB40-437D-AC13-5F91FFBE4C5E}" dt="2026-01-28T10:20:28.491" v="1145" actId="26606"/>
-          <ac:graphicFrameMkLst>
-            <pc:docMk/>
-            <pc:sldMk cId="4144213770" sldId="264"/>
-            <ac:graphicFrameMk id="11" creationId="{9CD4AF44-FAAD-C5BC-DC3E-89F737A44F02}"/>
-          </ac:graphicFrameMkLst>
-        </pc:graphicFrameChg>
-        <pc:graphicFrameChg chg="add del">
-          <ac:chgData name="NICOLO'MASSIMO LISENA" userId="f3d6d6cc-e1af-4921-83db-785f07c959d4" providerId="ADAL" clId="{52300CBB-EB40-437D-AC13-5F91FFBE4C5E}" dt="2026-01-28T10:20:32.174" v="1147" actId="26606"/>
-          <ac:graphicFrameMkLst>
-            <pc:docMk/>
-            <pc:sldMk cId="4144213770" sldId="264"/>
-            <ac:graphicFrameMk id="13" creationId="{B17CEFA7-9C93-F744-A345-8E0588B00A30}"/>
-          </ac:graphicFrameMkLst>
-        </pc:graphicFrameChg>
-        <pc:graphicFrameChg chg="add del">
-          <ac:chgData name="NICOLO'MASSIMO LISENA" userId="f3d6d6cc-e1af-4921-83db-785f07c959d4" providerId="ADAL" clId="{52300CBB-EB40-437D-AC13-5F91FFBE4C5E}" dt="2026-01-28T10:20:39.311" v="1149" actId="26606"/>
-          <ac:graphicFrameMkLst>
-            <pc:docMk/>
-            <pc:sldMk cId="4144213770" sldId="264"/>
-            <ac:graphicFrameMk id="15" creationId="{99BF891B-9F5B-2BA5-92C4-83C25A80E42E}"/>
-          </ac:graphicFrameMkLst>
-        </pc:graphicFrameChg>
-        <pc:graphicFrameChg chg="add mod modGraphic">
-          <ac:chgData name="NICOLO'MASSIMO LISENA" userId="f3d6d6cc-e1af-4921-83db-785f07c959d4" providerId="ADAL" clId="{52300CBB-EB40-437D-AC13-5F91FFBE4C5E}" dt="2026-01-28T10:46:35.945" v="1383" actId="208"/>
-          <ac:graphicFrameMkLst>
-            <pc:docMk/>
-            <pc:sldMk cId="4144213770" sldId="264"/>
-            <ac:graphicFrameMk id="17" creationId="{9CD4AF44-FAAD-C5BC-DC3E-89F737A44F02}"/>
-          </ac:graphicFrameMkLst>
-        </pc:graphicFrameChg>
-        <pc:picChg chg="add mod modCrop">
-          <ac:chgData name="NICOLO'MASSIMO LISENA" userId="f3d6d6cc-e1af-4921-83db-785f07c959d4" providerId="ADAL" clId="{52300CBB-EB40-437D-AC13-5F91FFBE4C5E}" dt="2026-01-28T10:12:23.311" v="1058" actId="1076"/>
-          <ac:picMkLst>
-            <pc:docMk/>
-            <pc:sldMk cId="4144213770" sldId="264"/>
-            <ac:picMk id="5" creationId="{5CFE1567-211B-869E-3B24-6F06782C7CB9}"/>
-          </ac:picMkLst>
-        </pc:picChg>
-        <pc:picChg chg="add mod">
-          <ac:chgData name="NICOLO'MASSIMO LISENA" userId="f3d6d6cc-e1af-4921-83db-785f07c959d4" providerId="ADAL" clId="{52300CBB-EB40-437D-AC13-5F91FFBE4C5E}" dt="2026-01-28T10:12:06.631" v="1056" actId="1076"/>
-          <ac:picMkLst>
-            <pc:docMk/>
-            <pc:sldMk cId="4144213770" sldId="264"/>
-            <ac:picMk id="8" creationId="{769B4775-9D0F-F198-FD16-28A74D26275B}"/>
-          </ac:picMkLst>
-        </pc:picChg>
-      </pc:sldChg>
-    </pc:docChg>
-  </pc:docChgLst>
-</pc:chgInfo>
 </file>
 
 <file path=ppt/diagrams/colors1.xml><?xml version="1.0" encoding="utf-8"?>
@@ -14597,14 +14371,14 @@
         <p:spPr>
           <a:xfrm>
             <a:off x="5305346" y="2007094"/>
-            <a:ext cx="5815236" cy="923330"/>
+            <a:ext cx="5815236" cy="4247317"/>
           </a:xfrm>
           <a:prstGeom prst="rect">
             <a:avLst/>
           </a:prstGeom>
         </p:spPr>
         <p:txBody>
-          <a:bodyPr wrap="square">
+          <a:bodyPr wrap="square" lIns="91440" tIns="45720" rIns="91440" bIns="45720" anchor="t">
             <a:spAutoFit/>
           </a:bodyPr>
           <a:lstStyle/>
@@ -14614,10 +14388,15 @@
                 <a:solidFill>
                   <a:srgbClr val="373737"/>
                 </a:solidFill>
-                <a:latin typeface="Helvetica Neue"/>
+                <a:ea typeface="+mn-lt"/>
+                <a:cs typeface="+mn-lt"/>
               </a:rPr>
-              <a:t>Il Sensore di distanza ad ultrasuoni HC SR04</a:t>
+              <a:t>Il Sensore di distanza ad ultrasuoni HCSR04</a:t>
             </a:r>
+            <a:endParaRPr lang="en-US" dirty="0">
+              <a:ea typeface="+mn-lt"/>
+              <a:cs typeface="+mn-lt"/>
+            </a:endParaRPr>
           </a:p>
           <a:p>
             <a:r>
@@ -14625,14 +14404,133 @@
                 <a:solidFill>
                   <a:srgbClr val="373737"/>
                 </a:solidFill>
-                <a:latin typeface="Helvetica Neue"/>
+                <a:ea typeface="+mn-lt"/>
+                <a:cs typeface="+mn-lt"/>
               </a:rPr>
-              <a:t>Ha 4 pin:</a:t>
+              <a:t>Ha 4 pin: </a:t>
+            </a:r>
+            <a:r>
+              <a:rPr lang="it-IT" b="1" dirty="0">
+                <a:solidFill>
+                  <a:srgbClr val="373737"/>
+                </a:solidFill>
+                <a:ea typeface="+mn-lt"/>
+                <a:cs typeface="+mn-lt"/>
+              </a:rPr>
+              <a:t>VCC(3.3V), TRIG, ECHO, GND</a:t>
+            </a:r>
+            <a:endParaRPr lang="it-IT" dirty="0">
+              <a:ea typeface="+mn-lt"/>
+              <a:cs typeface="+mn-lt"/>
+            </a:endParaRPr>
+          </a:p>
+          <a:p>
+            <a:endParaRPr lang="it-IT" dirty="0">
+              <a:latin typeface="Century Gothic"/>
+            </a:endParaRPr>
+          </a:p>
+          <a:p>
+            <a:r>
+              <a:rPr lang="it-IT" dirty="0">
+                <a:solidFill>
+                  <a:srgbClr val="000000"/>
+                </a:solidFill>
+                <a:latin typeface="Century Gothic"/>
+              </a:rPr>
+              <a:t>La comunicazione con questo sensore avviene</a:t>
+            </a:r>
+            <a:endParaRPr lang="en-US" dirty="0">
+              <a:latin typeface="Century Gothic"/>
+            </a:endParaRPr>
+          </a:p>
+          <a:p>
+            <a:r>
+              <a:rPr lang="it-IT" dirty="0">
+                <a:solidFill>
+                  <a:srgbClr val="000000"/>
+                </a:solidFill>
+                <a:latin typeface="Century Gothic"/>
+              </a:rPr>
+              <a:t>attraverso un driver. Quando il pin TRIG </a:t>
+            </a:r>
+            <a:r>
+              <a:rPr lang="it-IT" dirty="0" err="1">
+                <a:solidFill>
+                  <a:srgbClr val="000000"/>
+                </a:solidFill>
+                <a:latin typeface="Century Gothic"/>
+              </a:rPr>
+              <a:t>e'</a:t>
+            </a:r>
+            <a:r>
+              <a:rPr lang="it-IT" dirty="0">
+                <a:solidFill>
+                  <a:srgbClr val="000000"/>
+                </a:solidFill>
+                <a:latin typeface="Century Gothic"/>
+              </a:rPr>
+              <a:t> alto, il sensore invia un segnale ad ultrasuoni a 40Hz; quando il segnale rimbalza su un oggetto e colpisce il sensore, il pin ECHO viene messo alto per il tempo di volo del segnale.</a:t>
+            </a:r>
+            <a:endParaRPr lang="en-US" dirty="0">
+              <a:latin typeface="Century Gothic"/>
+            </a:endParaRPr>
+          </a:p>
+          <a:p>
+            <a:endParaRPr lang="it-IT" dirty="0">
+              <a:latin typeface="Century Gothic"/>
+            </a:endParaRPr>
+          </a:p>
+          <a:p>
+            <a:r>
+              <a:rPr lang="it-IT" dirty="0">
+                <a:solidFill>
+                  <a:srgbClr val="000000"/>
+                </a:solidFill>
+                <a:latin typeface="Century Gothic"/>
+              </a:rPr>
+              <a:t>La formula per la conversione in distanza usa la </a:t>
+            </a:r>
+            <a:r>
+              <a:rPr lang="it-IT" dirty="0" err="1">
+                <a:solidFill>
+                  <a:srgbClr val="000000"/>
+                </a:solidFill>
+                <a:latin typeface="Century Gothic"/>
+              </a:rPr>
+              <a:t>velocita'</a:t>
+            </a:r>
+            <a:r>
+              <a:rPr lang="it-IT" dirty="0">
+                <a:solidFill>
+                  <a:srgbClr val="000000"/>
+                </a:solidFill>
+                <a:latin typeface="Century Gothic"/>
+              </a:rPr>
+              <a:t> del suono nell'aria (340 m/s):</a:t>
+            </a:r>
+            <a:endParaRPr lang="en-US" dirty="0">
+              <a:latin typeface="Century Gothic"/>
+            </a:endParaRPr>
+          </a:p>
+          <a:p>
+            <a:endParaRPr lang="it-IT" dirty="0">
+              <a:latin typeface="Century Gothic"/>
+            </a:endParaRPr>
+          </a:p>
+          <a:p>
+            <a:r>
+              <a:rPr lang="it-IT" dirty="0">
+                <a:solidFill>
+                  <a:srgbClr val="000000"/>
+                </a:solidFill>
+                <a:latin typeface="Century Gothic"/>
+              </a:rPr>
+              <a:t>distanza = tempo[s] * 340[m/s] / 2</a:t>
             </a:r>
             <a:br>
               <a:rPr lang="it-IT" dirty="0"/>
             </a:br>
-            <a:endParaRPr lang="it-IT" dirty="0"/>
+            <a:endParaRPr lang="it-IT"/>
           </a:p>
         </p:txBody>
       </p:sp>
@@ -14654,7 +14552,13 @@
   <p:cSld>
     <p:spTree>
       <p:nvGrpSpPr>
-        <p:cNvPr id="1" name=""/>
+        <p:cNvPr id="1" name="">
+          <a:extLst>
+            <a:ext uri="{FF2B5EF4-FFF2-40B4-BE49-F238E27FC236}">
+              <a16:creationId xmlns:a16="http://schemas.microsoft.com/office/drawing/2014/main" id="{7435E4FF-A62E-428B-94ED-A8E64DA2ABD8}"/>
+            </a:ext>
+          </a:extLst>
+        </p:cNvPr>
         <p:cNvGrpSpPr/>
         <p:nvPr/>
       </p:nvGrpSpPr>
@@ -14668,7 +14572,13 @@
       </p:grpSpPr>
       <p:sp>
         <p:nvSpPr>
-          <p:cNvPr id="2" name="Titolo 1"/>
+          <p:cNvPr id="2" name="Titolo 1">
+            <a:extLst>
+              <a:ext uri="{FF2B5EF4-FFF2-40B4-BE49-F238E27FC236}">
+                <a16:creationId xmlns:a16="http://schemas.microsoft.com/office/drawing/2014/main" id="{B9FDD072-933F-C8BC-883D-A207308ADF8D}"/>
+              </a:ext>
+            </a:extLst>
+          </p:cNvPr>
           <p:cNvSpPr>
             <a:spLocks noGrp="1"/>
           </p:cNvSpPr>
@@ -14678,8 +14588,8 @@
         </p:nvSpPr>
         <p:spPr>
           <a:xfrm>
-            <a:off x="1459345" y="624110"/>
-            <a:ext cx="10045267" cy="1280890"/>
+            <a:off x="1801092" y="550219"/>
+            <a:ext cx="9721994" cy="1280890"/>
           </a:xfrm>
         </p:spPr>
         <p:txBody>
@@ -14689,21 +14599,241 @@
             <a:pPr algn="ctr"/>
             <a:r>
               <a:rPr lang="it-IT" dirty="0">
-                <a:latin typeface="Arial Black" panose="020B0A04020102020204" pitchFamily="34" charset="0"/>
+                <a:latin typeface="Arial Black"/>
               </a:rPr>
               <a:t>POMPA</a:t>
             </a:r>
-            <a:r>
-              <a:rPr lang="it-IT" dirty="0"/>
-              <a:t> </a:t>
-            </a:r>
+            <a:endParaRPr lang="it-IT" dirty="0">
+              <a:latin typeface="Arial Black" panose="020B0A04020102020204" pitchFamily="34" charset="0"/>
+            </a:endParaRPr>
           </a:p>
         </p:txBody>
       </p:sp>
+      <p:sp>
+        <p:nvSpPr>
+          <p:cNvPr id="4" name="Rettangolo 3">
+            <a:extLst>
+              <a:ext uri="{FF2B5EF4-FFF2-40B4-BE49-F238E27FC236}">
+                <a16:creationId xmlns:a16="http://schemas.microsoft.com/office/drawing/2014/main" id="{CB94F5AB-4F05-2D61-E81F-32ABC577AF5D}"/>
+              </a:ext>
+            </a:extLst>
+          </p:cNvPr>
+          <p:cNvSpPr/>
+          <p:nvPr/>
+        </p:nvSpPr>
+        <p:spPr>
+          <a:xfrm>
+            <a:off x="5305346" y="2007094"/>
+            <a:ext cx="5815236" cy="3139321"/>
+          </a:xfrm>
+          <a:prstGeom prst="rect">
+            <a:avLst/>
+          </a:prstGeom>
+        </p:spPr>
+        <p:txBody>
+          <a:bodyPr wrap="square" lIns="91440" tIns="45720" rIns="91440" bIns="45720" anchor="t">
+            <a:spAutoFit/>
+          </a:bodyPr>
+          <a:lstStyle/>
+          <a:p>
+            <a:r>
+              <a:rPr lang="it-IT" b="1" dirty="0">
+                <a:solidFill>
+                  <a:srgbClr val="373737"/>
+                </a:solidFill>
+                <a:latin typeface="Helvetica Neue"/>
+              </a:rPr>
+              <a:t>La pompa ad immersione</a:t>
+            </a:r>
+            <a:endParaRPr lang="it-IT" dirty="0">
+              <a:solidFill>
+                <a:srgbClr val="000000"/>
+              </a:solidFill>
+              <a:latin typeface="Century Gothic" panose="020B0502020202020204"/>
+            </a:endParaRPr>
+          </a:p>
+          <a:p>
+            <a:r>
+              <a:rPr lang="it-IT" dirty="0">
+                <a:solidFill>
+                  <a:srgbClr val="373737"/>
+                </a:solidFill>
+                <a:latin typeface="Helvetica Neue"/>
+              </a:rPr>
+              <a:t>Viene utilizzata con una fonte di alimentazione esterna e con un </a:t>
+            </a:r>
+            <a:r>
+              <a:rPr lang="it-IT" dirty="0" err="1">
+                <a:solidFill>
+                  <a:srgbClr val="373737"/>
+                </a:solidFill>
+                <a:latin typeface="Helvetica Neue"/>
+              </a:rPr>
+              <a:t>rele'</a:t>
+            </a:r>
+            <a:endParaRPr lang="it-IT" dirty="0">
+              <a:solidFill>
+                <a:srgbClr val="373737"/>
+              </a:solidFill>
+              <a:latin typeface="Helvetica Neue"/>
+            </a:endParaRPr>
+          </a:p>
+          <a:p>
+            <a:endParaRPr lang="it-IT" dirty="0">
+              <a:solidFill>
+                <a:srgbClr val="373737"/>
+              </a:solidFill>
+              <a:latin typeface="Helvetica Neue"/>
+            </a:endParaRPr>
+          </a:p>
+          <a:p>
+            <a:r>
+              <a:rPr lang="it-IT" dirty="0">
+                <a:solidFill>
+                  <a:srgbClr val="373737"/>
+                </a:solidFill>
+                <a:latin typeface="Helvetica Neue"/>
+              </a:rPr>
+              <a:t>Il </a:t>
+            </a:r>
+            <a:r>
+              <a:rPr lang="it-IT" dirty="0" err="1">
+                <a:solidFill>
+                  <a:srgbClr val="373737"/>
+                </a:solidFill>
+                <a:latin typeface="Helvetica Neue"/>
+              </a:rPr>
+              <a:t>rele'</a:t>
+            </a:r>
+            <a:r>
+              <a:rPr lang="it-IT" dirty="0">
+                <a:solidFill>
+                  <a:srgbClr val="373737"/>
+                </a:solidFill>
+                <a:latin typeface="Helvetica Neue"/>
+              </a:rPr>
+              <a:t> fornisce tre pin da collegare: VCC, GND e IN.</a:t>
+            </a:r>
+          </a:p>
+          <a:p>
+            <a:r>
+              <a:rPr lang="it-IT" dirty="0">
+                <a:solidFill>
+                  <a:srgbClr val="373737"/>
+                </a:solidFill>
+                <a:latin typeface="Helvetica Neue"/>
+                <a:ea typeface="+mn-lt"/>
+                <a:cs typeface="+mn-lt"/>
+              </a:rPr>
+              <a:t>Possiamo attivare la pompa mantenendo alto il pin IN per il tempo richiesto.</a:t>
+            </a:r>
+            <a:endParaRPr lang="it-IT">
+              <a:latin typeface="Helvetica Neue"/>
+            </a:endParaRPr>
+          </a:p>
+          <a:p>
+            <a:endParaRPr lang="it-IT" dirty="0">
+              <a:solidFill>
+                <a:srgbClr val="373737"/>
+              </a:solidFill>
+              <a:latin typeface="Helvetica Neue"/>
+            </a:endParaRPr>
+          </a:p>
+          <a:p>
+            <a:r>
+              <a:rPr lang="it-IT" dirty="0">
+                <a:solidFill>
+                  <a:srgbClr val="373737"/>
+                </a:solidFill>
+                <a:latin typeface="Helvetica Neue"/>
+              </a:rPr>
+              <a:t>Per il corretto funzionamento bisogna collegare la porta COM con l'alimentazione della pompa, e la porta NO (</a:t>
+            </a:r>
+            <a:r>
+              <a:rPr lang="it-IT" dirty="0" err="1">
+                <a:solidFill>
+                  <a:srgbClr val="373737"/>
+                </a:solidFill>
+                <a:latin typeface="Helvetica Neue"/>
+              </a:rPr>
+              <a:t>Normally</a:t>
+            </a:r>
+            <a:r>
+              <a:rPr lang="it-IT" dirty="0">
+                <a:solidFill>
+                  <a:srgbClr val="373737"/>
+                </a:solidFill>
+                <a:latin typeface="Helvetica Neue"/>
+              </a:rPr>
+              <a:t> Open) con l'alimentazione esterna.</a:t>
+            </a:r>
+          </a:p>
+        </p:txBody>
+      </p:sp>
+      <p:pic>
+        <p:nvPicPr>
+          <p:cNvPr id="5" name="Immagine 4" descr="Mini pompa ad immersione 12 Vdc">
+            <a:extLst>
+              <a:ext uri="{FF2B5EF4-FFF2-40B4-BE49-F238E27FC236}">
+                <a16:creationId xmlns:a16="http://schemas.microsoft.com/office/drawing/2014/main" id="{0C82FFB6-90A7-6666-4E1B-1600FB489FAF}"/>
+              </a:ext>
+            </a:extLst>
+          </p:cNvPr>
+          <p:cNvPicPr>
+            <a:picLocks noChangeAspect="1"/>
+          </p:cNvPicPr>
+          <p:nvPr/>
+        </p:nvPicPr>
+        <p:blipFill>
+          <a:blip r:embed="rId2"/>
+          <a:stretch>
+            <a:fillRect/>
+          </a:stretch>
+        </p:blipFill>
+        <p:spPr>
+          <a:xfrm>
+            <a:off x="856745" y="1394039"/>
+            <a:ext cx="2743200" cy="2743200"/>
+          </a:xfrm>
+          <a:prstGeom prst="rect">
+            <a:avLst/>
+          </a:prstGeom>
+        </p:spPr>
+      </p:pic>
+      <p:pic>
+        <p:nvPicPr>
+          <p:cNvPr id="6" name="Immagine 5" descr="Immagine che contiene Componente di circuito, Ingegneria elettronica, Componente elettrico, Componente di circuito passivo&#10;&#10;Il contenuto generato dall&amp;#39;IA potrebbe non essere corretto.">
+            <a:extLst>
+              <a:ext uri="{FF2B5EF4-FFF2-40B4-BE49-F238E27FC236}">
+                <a16:creationId xmlns:a16="http://schemas.microsoft.com/office/drawing/2014/main" id="{332D21D4-4E61-78A2-5376-864446A11576}"/>
+              </a:ext>
+            </a:extLst>
+          </p:cNvPr>
+          <p:cNvPicPr>
+            <a:picLocks noChangeAspect="1"/>
+          </p:cNvPicPr>
+          <p:nvPr/>
+        </p:nvPicPr>
+        <p:blipFill>
+          <a:blip r:embed="rId3"/>
+          <a:stretch>
+            <a:fillRect/>
+          </a:stretch>
+        </p:blipFill>
+        <p:spPr>
+          <a:xfrm>
+            <a:off x="2225963" y="4416180"/>
+            <a:ext cx="2533650" cy="1619250"/>
+          </a:xfrm>
+          <a:prstGeom prst="rect">
+            <a:avLst/>
+          </a:prstGeom>
+        </p:spPr>
+      </p:pic>
     </p:spTree>
     <p:extLst>
       <p:ext uri="{BB962C8B-B14F-4D97-AF65-F5344CB8AC3E}">
-        <p14:creationId xmlns:p14="http://schemas.microsoft.com/office/powerpoint/2010/main" val="1092441638"/>
+        <p14:creationId xmlns:p14="http://schemas.microsoft.com/office/powerpoint/2010/main" val="680447503"/>
       </p:ext>
     </p:extLst>
   </p:cSld>

</xml_diff>